<commit_message>
changed range of RTN rate and nelements
</commit_message>
<xml_diff>
--- a/nl_plots.pptx
+++ b/nl_plots.pptx
@@ -108,6 +108,11 @@
       </a:defRPr>
     </a:lvl9pPr>
   </p:defaultTextStyle>
+  <p:extLst>
+    <p:ext uri="{EFAFB233-063F-42B5-8137-9DF3F51BA10A}">
+      <p15:sldGuideLst xmlns:p15="http://schemas.microsoft.com/office/powerpoint/2012/main"/>
+    </p:ext>
+  </p:extLst>
 </p:presentation>
 </file>
 
@@ -3684,7 +3689,7 @@
         </p:nvSpPr>
         <p:spPr>
           <a:xfrm>
-            <a:off x="642996" y="4571216"/>
+            <a:off x="642996" y="5449701"/>
             <a:ext cx="10906008" cy="1115415"/>
           </a:xfrm>
         </p:spPr>
@@ -3696,102 +3701,12 @@
           <a:p>
             <a:pPr algn="ctr"/>
             <a:r>
-              <a:rPr lang="en-US" sz="4700"/>
+              <a:rPr lang="en-US" sz="4700" dirty="0"/>
               <a:t>MCMC with 3 kinds of RTN and varying NL</a:t>
             </a:r>
           </a:p>
         </p:txBody>
       </p:sp>
-      <p:pic>
-        <p:nvPicPr>
-          <p:cNvPr id="4" name="Picture 3" descr="A picture containing game&#10;&#10;Description automatically generated">
-            <a:extLst>
-              <a:ext uri="{FF2B5EF4-FFF2-40B4-BE49-F238E27FC236}">
-                <a16:creationId xmlns:a16="http://schemas.microsoft.com/office/drawing/2014/main" id="{BE8E2323-A312-F64A-B653-AD299BA0B4A7}"/>
-              </a:ext>
-            </a:extLst>
-          </p:cNvPr>
-          <p:cNvPicPr>
-            <a:picLocks noChangeAspect="1"/>
-          </p:cNvPicPr>
-          <p:nvPr/>
-        </p:nvPicPr>
-        <p:blipFill>
-          <a:blip r:embed="rId2"/>
-          <a:stretch>
-            <a:fillRect/>
-          </a:stretch>
-        </p:blipFill>
-        <p:spPr>
-          <a:xfrm>
-            <a:off x="481946" y="965622"/>
-            <a:ext cx="3529109" cy="2796817"/>
-          </a:xfrm>
-          <a:prstGeom prst="rect">
-            <a:avLst/>
-          </a:prstGeom>
-        </p:spPr>
-      </p:pic>
-      <p:pic>
-        <p:nvPicPr>
-          <p:cNvPr id="8" name="Picture 7" descr="A picture containing star&#10;&#10;Description automatically generated">
-            <a:extLst>
-              <a:ext uri="{FF2B5EF4-FFF2-40B4-BE49-F238E27FC236}">
-                <a16:creationId xmlns:a16="http://schemas.microsoft.com/office/drawing/2014/main" id="{1A3EE362-15E7-F04E-8A8C-23D7D4E27CC7}"/>
-              </a:ext>
-            </a:extLst>
-          </p:cNvPr>
-          <p:cNvPicPr>
-            <a:picLocks noChangeAspect="1"/>
-          </p:cNvPicPr>
-          <p:nvPr/>
-        </p:nvPicPr>
-        <p:blipFill>
-          <a:blip r:embed="rId3"/>
-          <a:stretch>
-            <a:fillRect/>
-          </a:stretch>
-        </p:blipFill>
-        <p:spPr>
-          <a:xfrm>
-            <a:off x="4332788" y="966686"/>
-            <a:ext cx="3526424" cy="2794689"/>
-          </a:xfrm>
-          <a:prstGeom prst="rect">
-            <a:avLst/>
-          </a:prstGeom>
-        </p:spPr>
-      </p:pic>
-      <p:pic>
-        <p:nvPicPr>
-          <p:cNvPr id="6" name="Picture 5" descr="A picture containing star&#10;&#10;Description automatically generated">
-            <a:extLst>
-              <a:ext uri="{FF2B5EF4-FFF2-40B4-BE49-F238E27FC236}">
-                <a16:creationId xmlns:a16="http://schemas.microsoft.com/office/drawing/2014/main" id="{667D6808-CB98-0646-8051-0A7EAF5E9671}"/>
-              </a:ext>
-            </a:extLst>
-          </p:cNvPr>
-          <p:cNvPicPr>
-            <a:picLocks noChangeAspect="1"/>
-          </p:cNvPicPr>
-          <p:nvPr/>
-        </p:nvPicPr>
-        <p:blipFill>
-          <a:blip r:embed="rId4"/>
-          <a:stretch>
-            <a:fillRect/>
-          </a:stretch>
-        </p:blipFill>
-        <p:spPr>
-          <a:xfrm>
-            <a:off x="8153400" y="982427"/>
-            <a:ext cx="3553968" cy="2763208"/>
-          </a:xfrm>
-          <a:prstGeom prst="rect">
-            <a:avLst/>
-          </a:prstGeom>
-        </p:spPr>
-      </p:pic>
       <p:cxnSp>
         <p:nvCxnSpPr>
           <p:cNvPr id="13" name="Straight Connector 12">
@@ -3844,6 +3759,126 @@
           </a:fontRef>
         </p:style>
       </p:cxnSp>
+      <p:pic>
+        <p:nvPicPr>
+          <p:cNvPr id="5" name="Picture 4" descr="A screenshot of a cell phone&#10;&#10;Description automatically generated">
+            <a:extLst>
+              <a:ext uri="{FF2B5EF4-FFF2-40B4-BE49-F238E27FC236}">
+                <a16:creationId xmlns:a16="http://schemas.microsoft.com/office/drawing/2014/main" id="{6A9454FC-7973-5F45-9E93-90758368EEBF}"/>
+              </a:ext>
+            </a:extLst>
+          </p:cNvPr>
+          <p:cNvPicPr>
+            <a:picLocks noChangeAspect="1"/>
+          </p:cNvPicPr>
+          <p:nvPr/>
+        </p:nvPicPr>
+        <p:blipFill>
+          <a:blip r:embed="rId2"/>
+          <a:stretch>
+            <a:fillRect/>
+          </a:stretch>
+        </p:blipFill>
+        <p:spPr>
+          <a:xfrm>
+            <a:off x="1159202" y="377550"/>
+            <a:ext cx="9873596" cy="1710987"/>
+          </a:xfrm>
+          <a:prstGeom prst="rect">
+            <a:avLst/>
+          </a:prstGeom>
+        </p:spPr>
+      </p:pic>
+      <p:pic>
+        <p:nvPicPr>
+          <p:cNvPr id="9" name="Picture 8">
+            <a:extLst>
+              <a:ext uri="{FF2B5EF4-FFF2-40B4-BE49-F238E27FC236}">
+                <a16:creationId xmlns:a16="http://schemas.microsoft.com/office/drawing/2014/main" id="{B998B6F9-C64C-F843-8D3D-0C80813FE2DA}"/>
+              </a:ext>
+            </a:extLst>
+          </p:cNvPr>
+          <p:cNvPicPr>
+            <a:picLocks noChangeAspect="1"/>
+          </p:cNvPicPr>
+          <p:nvPr/>
+        </p:nvPicPr>
+        <p:blipFill>
+          <a:blip r:embed="rId3"/>
+          <a:stretch>
+            <a:fillRect/>
+          </a:stretch>
+        </p:blipFill>
+        <p:spPr>
+          <a:xfrm>
+            <a:off x="100317" y="2346109"/>
+            <a:ext cx="4120787" cy="3399839"/>
+          </a:xfrm>
+          <a:prstGeom prst="rect">
+            <a:avLst/>
+          </a:prstGeom>
+        </p:spPr>
+      </p:pic>
+      <p:pic>
+        <p:nvPicPr>
+          <p:cNvPr id="11" name="Picture 10">
+            <a:extLst>
+              <a:ext uri="{FF2B5EF4-FFF2-40B4-BE49-F238E27FC236}">
+                <a16:creationId xmlns:a16="http://schemas.microsoft.com/office/drawing/2014/main" id="{DF46FE2B-8A89-8243-ACCC-199D39D20F2D}"/>
+              </a:ext>
+            </a:extLst>
+          </p:cNvPr>
+          <p:cNvPicPr>
+            <a:picLocks noChangeAspect="1"/>
+          </p:cNvPicPr>
+          <p:nvPr/>
+        </p:nvPicPr>
+        <p:blipFill>
+          <a:blip r:embed="rId4"/>
+          <a:stretch>
+            <a:fillRect/>
+          </a:stretch>
+        </p:blipFill>
+        <p:spPr>
+          <a:xfrm>
+            <a:off x="4479476" y="2593149"/>
+            <a:ext cx="3663950" cy="2906597"/>
+          </a:xfrm>
+          <a:prstGeom prst="rect">
+            <a:avLst/>
+          </a:prstGeom>
+        </p:spPr>
+      </p:pic>
+      <p:pic>
+        <p:nvPicPr>
+          <p:cNvPr id="14" name="Picture 13" descr="A close up of a screen&#10;&#10;Description automatically generated">
+            <a:extLst>
+              <a:ext uri="{FF2B5EF4-FFF2-40B4-BE49-F238E27FC236}">
+                <a16:creationId xmlns:a16="http://schemas.microsoft.com/office/drawing/2014/main" id="{51354C41-9112-FE4B-A265-2B5FECADDAE2}"/>
+              </a:ext>
+            </a:extLst>
+          </p:cNvPr>
+          <p:cNvPicPr>
+            <a:picLocks noChangeAspect="1"/>
+          </p:cNvPicPr>
+          <p:nvPr/>
+        </p:nvPicPr>
+        <p:blipFill>
+          <a:blip r:embed="rId5"/>
+          <a:stretch>
+            <a:fillRect/>
+          </a:stretch>
+        </p:blipFill>
+        <p:spPr>
+          <a:xfrm>
+            <a:off x="8143426" y="2643194"/>
+            <a:ext cx="3663950" cy="2845190"/>
+          </a:xfrm>
+          <a:prstGeom prst="rect">
+            <a:avLst/>
+          </a:prstGeom>
+        </p:spPr>
+      </p:pic>
     </p:spTree>
     <p:extLst>
       <p:ext uri="{BB962C8B-B14F-4D97-AF65-F5344CB8AC3E}">
@@ -3901,10 +3936,10 @@
       </p:sp>
       <p:pic>
         <p:nvPicPr>
-          <p:cNvPr id="4" name="Picture 3">
+          <p:cNvPr id="5" name="Picture 4">
             <a:extLst>
               <a:ext uri="{FF2B5EF4-FFF2-40B4-BE49-F238E27FC236}">
-                <a16:creationId xmlns:a16="http://schemas.microsoft.com/office/drawing/2014/main" id="{3DB4585E-757A-AA42-9F57-E43174C8BA55}"/>
+                <a16:creationId xmlns:a16="http://schemas.microsoft.com/office/drawing/2014/main" id="{451E4039-6ABE-0C46-B482-FB8236A60756}"/>
               </a:ext>
             </a:extLst>
           </p:cNvPr>
@@ -3921,8 +3956,8 @@
         </p:blipFill>
         <p:spPr>
           <a:xfrm>
-            <a:off x="50800" y="260350"/>
-            <a:ext cx="12090400" cy="6337300"/>
+            <a:off x="19050" y="254000"/>
+            <a:ext cx="12153900" cy="6350000"/>
           </a:xfrm>
           <a:prstGeom prst="rect">
             <a:avLst/>

</xml_diff>

<commit_message>
pdf updated with more details
</commit_message>
<xml_diff>
--- a/nl_plots.pptx
+++ b/nl_plots.pptx
@@ -2985,12 +2985,12 @@
           <a:chExt cx="0" cy="0"/>
         </a:xfrm>
       </p:grpSpPr>
-      <p:sp>
-        <p:nvSpPr>
-          <p:cNvPr id="22" name="Rectangle 21">
+      <p:sp useBgFill="1">
+        <p:nvSpPr>
+          <p:cNvPr id="31" name="Rectangle 30">
             <a:extLst>
               <a:ext uri="{FF2B5EF4-FFF2-40B4-BE49-F238E27FC236}">
-                <a16:creationId xmlns:a16="http://schemas.microsoft.com/office/drawing/2014/main" id="{823AC064-BC96-4F32-8AE1-B2FD38754823}"/>
+                <a16:creationId xmlns:a16="http://schemas.microsoft.com/office/drawing/2014/main" id="{6057E0BB-58EB-465F-AD1E-92692B4B6870}"/>
               </a:ext>
               <a:ext uri="{C183D7F6-B498-43B3-948B-1728B52AA6E4}">
                 <adec:decorative xmlns:adec="http://schemas.microsoft.com/office/drawing/2017/decorative" val="1"/>
@@ -3008,21 +3008,16 @@
             </p:extLst>
           </p:nvPr>
         </p:nvSpPr>
-        <p:spPr bwMode="ltGray">
+        <p:spPr>
           <a:xfrm>
-            <a:off x="396882" y="280374"/>
-            <a:ext cx="11438793" cy="1844256"/>
+            <a:off x="0" y="0"/>
+            <a:ext cx="12192000" cy="6858000"/>
           </a:xfrm>
           <a:prstGeom prst="rect">
             <a:avLst/>
           </a:prstGeom>
-          <a:solidFill>
-            <a:srgbClr val="404040"/>
-          </a:solidFill>
-          <a:ln w="127000" cap="sq" cmpd="thinThick">
-            <a:solidFill>
-              <a:srgbClr val="404040"/>
-            </a:solidFill>
+          <a:ln>
+            <a:noFill/>
           </a:ln>
         </p:spPr>
         <p:style>
@@ -3068,65 +3063,72 @@
         </p:nvSpPr>
         <p:spPr>
           <a:xfrm>
-            <a:off x="546351" y="433545"/>
-            <a:ext cx="11139854" cy="930447"/>
+            <a:off x="838199" y="4433078"/>
+            <a:ext cx="10515600" cy="1092050"/>
           </a:xfrm>
         </p:spPr>
         <p:txBody>
           <a:bodyPr vert="horz" lIns="91440" tIns="45720" rIns="91440" bIns="45720" rtlCol="0" anchor="b">
-            <a:normAutofit/>
+            <a:normAutofit fontScale="90000"/>
           </a:bodyPr>
           <a:lstStyle/>
           <a:p>
             <a:pPr algn="ctr"/>
             <a:br>
-              <a:rPr lang="en-US" sz="1800">
-                <a:solidFill>
-                  <a:srgbClr val="FFFFFF"/>
-                </a:solidFill>
-              </a:rPr>
+              <a:rPr lang="en-US" sz="2100" dirty="0"/>
             </a:br>
             <a:r>
-              <a:rPr lang="en-US" sz="1800">
-                <a:solidFill>
-                  <a:srgbClr val="FFFFFF"/>
-                </a:solidFill>
-              </a:rPr>
+              <a:rPr lang="en-US" sz="2100" dirty="0"/>
               <a:t>sample MAAC simulator with and without RTN</a:t>
             </a:r>
             <a:br>
-              <a:rPr lang="en-US" sz="1800">
-                <a:solidFill>
-                  <a:srgbClr val="FFFFFF"/>
-                </a:solidFill>
-              </a:rPr>
+              <a:rPr lang="en-US" sz="2100" dirty="0"/>
             </a:br>
             <a:r>
-              <a:rPr lang="en-US" sz="1800">
-                <a:solidFill>
-                  <a:srgbClr val="FFFFFF"/>
-                </a:solidFill>
-              </a:rPr>
+              <a:rPr lang="en-US" sz="2100" dirty="0"/>
+              <a:t>Light current = 10.0, Dark current = 0.04, read noise = 9.0 and  (ng=15, </a:t>
+            </a:r>
+            <a:r>
+              <a:rPr lang="en-US" sz="2100" dirty="0" err="1"/>
+              <a:t>nf</a:t>
+            </a:r>
+            <a:r>
+              <a:rPr lang="en-US" sz="2100" dirty="0"/>
+              <a:t>=16, </a:t>
+            </a:r>
+            <a:r>
+              <a:rPr lang="en-US" sz="2100" dirty="0" err="1"/>
+              <a:t>nd</a:t>
+            </a:r>
+            <a:r>
+              <a:rPr lang="en-US" sz="2100" dirty="0"/>
+              <a:t>=11)</a:t>
+            </a:r>
+            <a:br>
+              <a:rPr lang="en-US" sz="2100" dirty="0"/>
+            </a:br>
+            <a:r>
+              <a:rPr lang="en-US" sz="2100" dirty="0"/>
               <a:t> </a:t>
             </a:r>
           </a:p>
         </p:txBody>
       </p:sp>
-      <p:cxnSp>
-        <p:nvCxnSpPr>
-          <p:cNvPr id="24" name="Straight Connector 23">
+      <p:sp useBgFill="1">
+        <p:nvSpPr>
+          <p:cNvPr id="33" name="Rectangle 32">
             <a:extLst>
               <a:ext uri="{FF2B5EF4-FFF2-40B4-BE49-F238E27FC236}">
-                <a16:creationId xmlns:a16="http://schemas.microsoft.com/office/drawing/2014/main" id="{7E7C77BC-7138-40B1-A15B-20F57A494629}"/>
+                <a16:creationId xmlns:a16="http://schemas.microsoft.com/office/drawing/2014/main" id="{284A8429-F65A-490D-96E4-1158D3E8A026}"/>
               </a:ext>
               <a:ext uri="{C183D7F6-B498-43B3-948B-1728B52AA6E4}">
                 <adec:decorative xmlns:adec="http://schemas.microsoft.com/office/drawing/2017/decorative" val="1"/>
               </a:ext>
             </a:extLst>
           </p:cNvPr>
-          <p:cNvCxnSpPr>
-            <a:cxnSpLocks noGrp="1" noRot="1" noChangeAspect="1" noMove="1" noResize="1" noEditPoints="1" noAdjustHandles="1" noChangeArrowheads="1" noChangeShapeType="1"/>
-          </p:cNvCxnSpPr>
+          <p:cNvSpPr>
+            <a:spLocks noGrp="1" noRot="1" noChangeAspect="1" noMove="1" noResize="1" noEditPoints="1" noAdjustHandles="1" noChangeArrowheads="1" noChangeShapeType="1" noTextEdit="1"/>
+          </p:cNvSpPr>
           <p:nvPr>
             <p:extLst>
               <p:ext uri="{386F3935-93C4-4BCD-93E2-E3B085C9AB24}">
@@ -3134,42 +3136,89 @@
               </p:ext>
             </p:extLst>
           </p:nvPr>
-        </p:nvCxnSpPr>
+        </p:nvSpPr>
         <p:spPr>
           <a:xfrm>
-            <a:off x="2230078" y="1522292"/>
-            <a:ext cx="7772400" cy="0"/>
+            <a:off x="838199" y="5453947"/>
+            <a:ext cx="10515599" cy="822960"/>
           </a:xfrm>
-          <a:prstGeom prst="line">
+          <a:prstGeom prst="rect">
             <a:avLst/>
           </a:prstGeom>
-          <a:ln w="22225">
+          <a:ln w="12700">
             <a:solidFill>
-              <a:srgbClr val="D9D9D9"/>
+              <a:srgbClr val="DEDEDE"/>
             </a:solidFill>
           </a:ln>
+          <a:effectLst>
+            <a:outerShdw blurRad="50800" dist="38100" dir="2700000" algn="tl" rotWithShape="0">
+              <a:schemeClr val="bg1">
+                <a:lumMod val="85000"/>
+                <a:alpha val="50000"/>
+              </a:schemeClr>
+            </a:outerShdw>
+          </a:effectLst>
         </p:spPr>
         <p:style>
-          <a:lnRef idx="1">
-            <a:schemeClr val="accent1"/>
+          <a:lnRef idx="2">
+            <a:schemeClr val="accent1">
+              <a:shade val="50000"/>
+            </a:schemeClr>
           </a:lnRef>
-          <a:fillRef idx="0">
+          <a:fillRef idx="1">
             <a:schemeClr val="accent1"/>
           </a:fillRef>
           <a:effectRef idx="0">
             <a:schemeClr val="accent1"/>
           </a:effectRef>
           <a:fontRef idx="minor">
-            <a:schemeClr val="tx1"/>
+            <a:schemeClr val="lt1"/>
           </a:fontRef>
         </p:style>
-      </p:cxnSp>
+        <p:txBody>
+          <a:bodyPr rtlCol="0" anchor="ctr"/>
+          <a:lstStyle/>
+          <a:p>
+            <a:pPr marL="0" marR="0" lvl="0" indent="0" algn="ctr" defTabSz="914400" rtl="0" eaLnBrk="1" fontAlgn="auto" latinLnBrk="0" hangingPunct="1">
+              <a:lnSpc>
+                <a:spcPct val="100000"/>
+              </a:lnSpc>
+              <a:spcBef>
+                <a:spcPts val="0"/>
+              </a:spcBef>
+              <a:spcAft>
+                <a:spcPts val="0"/>
+              </a:spcAft>
+              <a:buClrTx/>
+              <a:buSzTx/>
+              <a:buFontTx/>
+              <a:buNone/>
+              <a:tabLst/>
+              <a:defRPr/>
+            </a:pPr>
+            <a:endParaRPr kumimoji="0" lang="en-US" sz="1800" b="0" i="0" u="none" strike="noStrike" kern="1200" cap="none" spc="0" normalizeH="0" baseline="0" noProof="0" dirty="0">
+              <a:ln>
+                <a:noFill/>
+              </a:ln>
+              <a:solidFill>
+                <a:prstClr val="white"/>
+              </a:solidFill>
+              <a:effectLst/>
+              <a:uLnTx/>
+              <a:uFillTx/>
+              <a:latin typeface="Calibri" panose="020F0502020204030204"/>
+              <a:ea typeface="+mn-ea"/>
+              <a:cs typeface="+mn-cs"/>
+            </a:endParaRPr>
+          </a:p>
+        </p:txBody>
+      </p:sp>
       <p:pic>
         <p:nvPicPr>
-          <p:cNvPr id="17" name="Picture 16" descr="A screen shot of a computer&#10;&#10;Description automatically generated">
+          <p:cNvPr id="12" name="Picture 11" descr="A picture containing black, monitor, meter&#10;&#10;Description automatically generated">
             <a:extLst>
               <a:ext uri="{FF2B5EF4-FFF2-40B4-BE49-F238E27FC236}">
-                <a16:creationId xmlns:a16="http://schemas.microsoft.com/office/drawing/2014/main" id="{6C9814D4-9933-9F48-BDFD-89675381402C}"/>
+                <a16:creationId xmlns:a16="http://schemas.microsoft.com/office/drawing/2014/main" id="{B50062EC-F278-B24F-A462-F2F86E6D4B70}"/>
               </a:ext>
             </a:extLst>
           </p:cNvPr>
@@ -3186,72 +3235,20 @@
         </p:blipFill>
         <p:spPr>
           <a:xfrm>
-            <a:off x="331567" y="2686564"/>
-            <a:ext cx="5455917" cy="3478145"/>
+            <a:off x="838199" y="597232"/>
+            <a:ext cx="5140661" cy="3200060"/>
           </a:xfrm>
           <a:prstGeom prst="rect">
             <a:avLst/>
           </a:prstGeom>
         </p:spPr>
       </p:pic>
-      <p:cxnSp>
-        <p:nvCxnSpPr>
-          <p:cNvPr id="26" name="Straight Connector 25">
+      <p:pic>
+        <p:nvPicPr>
+          <p:cNvPr id="17" name="Picture 16" descr="A screen shot of a computer&#10;&#10;Description automatically generated">
             <a:extLst>
               <a:ext uri="{FF2B5EF4-FFF2-40B4-BE49-F238E27FC236}">
-                <a16:creationId xmlns:a16="http://schemas.microsoft.com/office/drawing/2014/main" id="{DB146403-F3D6-484B-B2ED-97F9565D0370}"/>
-              </a:ext>
-              <a:ext uri="{C183D7F6-B498-43B3-948B-1728B52AA6E4}">
-                <adec:decorative xmlns:adec="http://schemas.microsoft.com/office/drawing/2017/decorative" val="1"/>
-              </a:ext>
-            </a:extLst>
-          </p:cNvPr>
-          <p:cNvCxnSpPr>
-            <a:cxnSpLocks noGrp="1" noRot="1" noChangeAspect="1" noMove="1" noResize="1" noEditPoints="1" noAdjustHandles="1" noChangeArrowheads="1" noChangeShapeType="1"/>
-          </p:cNvCxnSpPr>
-          <p:nvPr>
-            <p:extLst>
-              <p:ext uri="{386F3935-93C4-4BCD-93E2-E3B085C9AB24}">
-                <p16:designElem xmlns:p16="http://schemas.microsoft.com/office/powerpoint/2015/main" val="1"/>
-              </p:ext>
-            </p:extLst>
-          </p:nvPr>
-        </p:nvCxnSpPr>
-        <p:spPr>
-          <a:xfrm>
-            <a:off x="6116278" y="2596836"/>
-            <a:ext cx="0" cy="3657600"/>
-          </a:xfrm>
-          <a:prstGeom prst="line">
-            <a:avLst/>
-          </a:prstGeom>
-          <a:ln w="101600" cmpd="dbl">
-            <a:solidFill>
-              <a:srgbClr val="595959"/>
-            </a:solidFill>
-          </a:ln>
-        </p:spPr>
-        <p:style>
-          <a:lnRef idx="1">
-            <a:schemeClr val="accent1"/>
-          </a:lnRef>
-          <a:fillRef idx="0">
-            <a:schemeClr val="accent1"/>
-          </a:fillRef>
-          <a:effectRef idx="0">
-            <a:schemeClr val="accent1"/>
-          </a:effectRef>
-          <a:fontRef idx="minor">
-            <a:schemeClr val="tx1"/>
-          </a:fontRef>
-        </p:style>
-      </p:cxnSp>
-      <p:pic>
-        <p:nvPicPr>
-          <p:cNvPr id="12" name="Picture 11" descr="A picture containing black, monitor, meter&#10;&#10;Description automatically generated">
-            <a:extLst>
-              <a:ext uri="{FF2B5EF4-FFF2-40B4-BE49-F238E27FC236}">
-                <a16:creationId xmlns:a16="http://schemas.microsoft.com/office/drawing/2014/main" id="{B50062EC-F278-B24F-A462-F2F86E6D4B70}"/>
+                <a16:creationId xmlns:a16="http://schemas.microsoft.com/office/drawing/2014/main" id="{6C9814D4-9933-9F48-BDFD-89675381402C}"/>
               </a:ext>
             </a:extLst>
           </p:cNvPr>
@@ -3268,14 +3265,82 @@
         </p:blipFill>
         <p:spPr>
           <a:xfrm>
-            <a:off x="6445073" y="2727483"/>
-            <a:ext cx="5455917" cy="3396307"/>
+            <a:off x="6213142" y="558679"/>
+            <a:ext cx="5140656" cy="3277167"/>
           </a:xfrm>
           <a:prstGeom prst="rect">
             <a:avLst/>
           </a:prstGeom>
         </p:spPr>
       </p:pic>
+      <p:sp>
+        <p:nvSpPr>
+          <p:cNvPr id="35" name="Rectangle 34">
+            <a:extLst>
+              <a:ext uri="{FF2B5EF4-FFF2-40B4-BE49-F238E27FC236}">
+                <a16:creationId xmlns:a16="http://schemas.microsoft.com/office/drawing/2014/main" id="{0F022291-A82B-4D23-A1E0-5F9BD684669E}"/>
+              </a:ext>
+              <a:ext uri="{C183D7F6-B498-43B3-948B-1728B52AA6E4}">
+                <adec:decorative xmlns:adec="http://schemas.microsoft.com/office/drawing/2017/decorative" val="1"/>
+              </a:ext>
+            </a:extLst>
+          </p:cNvPr>
+          <p:cNvSpPr>
+            <a:spLocks noGrp="1" noRot="1" noChangeAspect="1" noMove="1" noResize="1" noEditPoints="1" noAdjustHandles="1" noChangeArrowheads="1" noChangeShapeType="1" noTextEdit="1"/>
+          </p:cNvSpPr>
+          <p:nvPr>
+            <p:extLst>
+              <p:ext uri="{386F3935-93C4-4BCD-93E2-E3B085C9AB24}">
+                <p16:designElem xmlns:p16="http://schemas.microsoft.com/office/powerpoint/2015/main" val="1"/>
+              </p:ext>
+            </p:extLst>
+          </p:nvPr>
+        </p:nvSpPr>
+        <p:spPr>
+          <a:xfrm rot="5400000">
+            <a:off x="6041136" y="5917696"/>
+            <a:ext cx="109728" cy="731520"/>
+          </a:xfrm>
+          <a:prstGeom prst="rect">
+            <a:avLst/>
+          </a:prstGeom>
+          <a:solidFill>
+            <a:schemeClr val="accent2"/>
+          </a:solidFill>
+          <a:ln>
+            <a:noFill/>
+          </a:ln>
+        </p:spPr>
+        <p:style>
+          <a:lnRef idx="2">
+            <a:schemeClr val="accent1">
+              <a:shade val="50000"/>
+            </a:schemeClr>
+          </a:lnRef>
+          <a:fillRef idx="1">
+            <a:schemeClr val="accent1"/>
+          </a:fillRef>
+          <a:effectRef idx="0">
+            <a:schemeClr val="accent1"/>
+          </a:effectRef>
+          <a:fontRef idx="minor">
+            <a:schemeClr val="lt1"/>
+          </a:fontRef>
+        </p:style>
+        <p:txBody>
+          <a:bodyPr rtlCol="0" anchor="ctr"/>
+          <a:lstStyle/>
+          <a:p>
+            <a:pPr algn="ctr"/>
+            <a:endParaRPr lang="en-US">
+              <a:solidFill>
+                <a:prstClr val="white"/>
+              </a:solidFill>
+              <a:latin typeface="Calibri" panose="020F0502020204030204"/>
+            </a:endParaRPr>
+          </a:p>
+        </p:txBody>
+      </p:sp>
     </p:spTree>
     <p:extLst>
       <p:ext uri="{BB962C8B-B14F-4D97-AF65-F5344CB8AC3E}">
@@ -3407,12 +3472,12 @@
           <a:p>
             <a:pPr algn="ctr"/>
             <a:r>
-              <a:rPr lang="en-US" sz="3200">
+              <a:rPr lang="en-US" sz="3200" dirty="0">
                 <a:solidFill>
                   <a:schemeClr val="bg1"/>
                 </a:solidFill>
               </a:rPr>
-              <a:t>With NO NL and RTN, how stable the QF and DPU signal? </a:t>
+              <a:t>With NO NL and RTN, change in the QF and DPU signal</a:t>
             </a:r>
           </a:p>
         </p:txBody>

</xml_diff>

<commit_message>
Plots of QF and Signal vs RTN parameters added
</commit_message>
<xml_diff>
--- a/nl_plots.pptx
+++ b/nl_plots.pptx
@@ -10,6 +10,8 @@
     <p:sldId id="258" r:id="rId4"/>
     <p:sldId id="259" r:id="rId5"/>
     <p:sldId id="260" r:id="rId6"/>
+    <p:sldId id="261" r:id="rId7"/>
+    <p:sldId id="262" r:id="rId8"/>
   </p:sldIdLst>
   <p:sldSz cx="12192000" cy="6858000"/>
   <p:notesSz cx="6858000" cy="9144000"/>
@@ -247,7 +249,7 @@
           <a:p>
             <a:fld id="{9FBAE5A1-245E-3F4A-B3A1-649E783F22D3}" type="datetimeFigureOut">
               <a:rPr lang="en-US" smtClean="0"/>
-              <a:t>5/14/20</a:t>
+              <a:t>5/19/20</a:t>
             </a:fld>
             <a:endParaRPr lang="en-US"/>
           </a:p>
@@ -417,7 +419,7 @@
           <a:p>
             <a:fld id="{9FBAE5A1-245E-3F4A-B3A1-649E783F22D3}" type="datetimeFigureOut">
               <a:rPr lang="en-US" smtClean="0"/>
-              <a:t>5/14/20</a:t>
+              <a:t>5/19/20</a:t>
             </a:fld>
             <a:endParaRPr lang="en-US"/>
           </a:p>
@@ -597,7 +599,7 @@
           <a:p>
             <a:fld id="{9FBAE5A1-245E-3F4A-B3A1-649E783F22D3}" type="datetimeFigureOut">
               <a:rPr lang="en-US" smtClean="0"/>
-              <a:t>5/14/20</a:t>
+              <a:t>5/19/20</a:t>
             </a:fld>
             <a:endParaRPr lang="en-US"/>
           </a:p>
@@ -767,7 +769,7 @@
           <a:p>
             <a:fld id="{9FBAE5A1-245E-3F4A-B3A1-649E783F22D3}" type="datetimeFigureOut">
               <a:rPr lang="en-US" smtClean="0"/>
-              <a:t>5/14/20</a:t>
+              <a:t>5/19/20</a:t>
             </a:fld>
             <a:endParaRPr lang="en-US"/>
           </a:p>
@@ -1013,7 +1015,7 @@
           <a:p>
             <a:fld id="{9FBAE5A1-245E-3F4A-B3A1-649E783F22D3}" type="datetimeFigureOut">
               <a:rPr lang="en-US" smtClean="0"/>
-              <a:t>5/14/20</a:t>
+              <a:t>5/19/20</a:t>
             </a:fld>
             <a:endParaRPr lang="en-US"/>
           </a:p>
@@ -1245,7 +1247,7 @@
           <a:p>
             <a:fld id="{9FBAE5A1-245E-3F4A-B3A1-649E783F22D3}" type="datetimeFigureOut">
               <a:rPr lang="en-US" smtClean="0"/>
-              <a:t>5/14/20</a:t>
+              <a:t>5/19/20</a:t>
             </a:fld>
             <a:endParaRPr lang="en-US"/>
           </a:p>
@@ -1612,7 +1614,7 @@
           <a:p>
             <a:fld id="{9FBAE5A1-245E-3F4A-B3A1-649E783F22D3}" type="datetimeFigureOut">
               <a:rPr lang="en-US" smtClean="0"/>
-              <a:t>5/14/20</a:t>
+              <a:t>5/19/20</a:t>
             </a:fld>
             <a:endParaRPr lang="en-US"/>
           </a:p>
@@ -1730,7 +1732,7 @@
           <a:p>
             <a:fld id="{9FBAE5A1-245E-3F4A-B3A1-649E783F22D3}" type="datetimeFigureOut">
               <a:rPr lang="en-US" smtClean="0"/>
-              <a:t>5/14/20</a:t>
+              <a:t>5/19/20</a:t>
             </a:fld>
             <a:endParaRPr lang="en-US"/>
           </a:p>
@@ -1825,7 +1827,7 @@
           <a:p>
             <a:fld id="{9FBAE5A1-245E-3F4A-B3A1-649E783F22D3}" type="datetimeFigureOut">
               <a:rPr lang="en-US" smtClean="0"/>
-              <a:t>5/14/20</a:t>
+              <a:t>5/19/20</a:t>
             </a:fld>
             <a:endParaRPr lang="en-US"/>
           </a:p>
@@ -2102,7 +2104,7 @@
           <a:p>
             <a:fld id="{9FBAE5A1-245E-3F4A-B3A1-649E783F22D3}" type="datetimeFigureOut">
               <a:rPr lang="en-US" smtClean="0"/>
-              <a:t>5/14/20</a:t>
+              <a:t>5/19/20</a:t>
             </a:fld>
             <a:endParaRPr lang="en-US"/>
           </a:p>
@@ -2359,7 +2361,7 @@
           <a:p>
             <a:fld id="{9FBAE5A1-245E-3F4A-B3A1-649E783F22D3}" type="datetimeFigureOut">
               <a:rPr lang="en-US" smtClean="0"/>
-              <a:t>5/14/20</a:t>
+              <a:t>5/19/20</a:t>
             </a:fld>
             <a:endParaRPr lang="en-US"/>
           </a:p>
@@ -2572,7 +2574,7 @@
           <a:p>
             <a:fld id="{9FBAE5A1-245E-3F4A-B3A1-649E783F22D3}" type="datetimeFigureOut">
               <a:rPr lang="en-US" smtClean="0"/>
-              <a:t>5/14/20</a:t>
+              <a:t>5/19/20</a:t>
             </a:fld>
             <a:endParaRPr lang="en-US"/>
           </a:p>
@@ -4042,6 +4044,198 @@
 </p:sld>
 </file>
 
+<file path=ppt/slides/slide6.xml><?xml version="1.0" encoding="utf-8"?>
+<p:sld xmlns:a="http://schemas.openxmlformats.org/drawingml/2006/main" xmlns:r="http://schemas.openxmlformats.org/officeDocument/2006/relationships" xmlns:p="http://schemas.openxmlformats.org/presentationml/2006/main">
+  <p:cSld>
+    <p:spTree>
+      <p:nvGrpSpPr>
+        <p:cNvPr id="1" name=""/>
+        <p:cNvGrpSpPr/>
+        <p:nvPr/>
+      </p:nvGrpSpPr>
+      <p:grpSpPr>
+        <a:xfrm>
+          <a:off x="0" y="0"/>
+          <a:ext cx="0" cy="0"/>
+          <a:chOff x="0" y="0"/>
+          <a:chExt cx="0" cy="0"/>
+        </a:xfrm>
+      </p:grpSpPr>
+      <p:sp>
+        <p:nvSpPr>
+          <p:cNvPr id="2" name="Title 1">
+            <a:extLst>
+              <a:ext uri="{FF2B5EF4-FFF2-40B4-BE49-F238E27FC236}">
+                <a16:creationId xmlns:a16="http://schemas.microsoft.com/office/drawing/2014/main" id="{FD51F55E-6F5C-6246-BD2D-EAFE77C30FED}"/>
+              </a:ext>
+            </a:extLst>
+          </p:cNvPr>
+          <p:cNvSpPr>
+            <a:spLocks noGrp="1"/>
+          </p:cNvSpPr>
+          <p:nvPr>
+            <p:ph type="title"/>
+          </p:nvPr>
+        </p:nvSpPr>
+        <p:spPr/>
+        <p:txBody>
+          <a:bodyPr/>
+          <a:lstStyle/>
+          <a:p>
+            <a:r>
+              <a:rPr lang="en-US" dirty="0"/>
+              <a:t>Almost no dependence of Signal on </a:t>
+            </a:r>
+            <a:r>
+              <a:rPr lang="en-US" dirty="0" err="1"/>
+              <a:t>nelements</a:t>
+            </a:r>
+            <a:r>
+              <a:rPr lang="en-US" dirty="0"/>
+              <a:t> and rate of RTN</a:t>
+            </a:r>
+          </a:p>
+        </p:txBody>
+      </p:sp>
+      <p:pic>
+        <p:nvPicPr>
+          <p:cNvPr id="4" name="Picture 3" descr="A picture containing sitting, table, wooden, covered&#10;&#10;Description automatically generated">
+            <a:extLst>
+              <a:ext uri="{FF2B5EF4-FFF2-40B4-BE49-F238E27FC236}">
+                <a16:creationId xmlns:a16="http://schemas.microsoft.com/office/drawing/2014/main" id="{77C60921-63E3-A94E-82F5-C6D2B972ABD7}"/>
+              </a:ext>
+            </a:extLst>
+          </p:cNvPr>
+          <p:cNvPicPr>
+            <a:picLocks noChangeAspect="1"/>
+          </p:cNvPicPr>
+          <p:nvPr/>
+        </p:nvPicPr>
+        <p:blipFill>
+          <a:blip r:embed="rId2"/>
+          <a:stretch>
+            <a:fillRect/>
+          </a:stretch>
+        </p:blipFill>
+        <p:spPr>
+          <a:xfrm>
+            <a:off x="406400" y="1857375"/>
+            <a:ext cx="11379200" cy="4635500"/>
+          </a:xfrm>
+          <a:prstGeom prst="rect">
+            <a:avLst/>
+          </a:prstGeom>
+        </p:spPr>
+      </p:pic>
+    </p:spTree>
+    <p:extLst>
+      <p:ext uri="{BB962C8B-B14F-4D97-AF65-F5344CB8AC3E}">
+        <p14:creationId xmlns:p14="http://schemas.microsoft.com/office/powerpoint/2010/main" val="2465241784"/>
+      </p:ext>
+    </p:extLst>
+  </p:cSld>
+  <p:clrMapOvr>
+    <a:masterClrMapping/>
+  </p:clrMapOvr>
+</p:sld>
+</file>
+
+<file path=ppt/slides/slide7.xml><?xml version="1.0" encoding="utf-8"?>
+<p:sld xmlns:a="http://schemas.openxmlformats.org/drawingml/2006/main" xmlns:r="http://schemas.openxmlformats.org/officeDocument/2006/relationships" xmlns:p="http://schemas.openxmlformats.org/presentationml/2006/main">
+  <p:cSld>
+    <p:spTree>
+      <p:nvGrpSpPr>
+        <p:cNvPr id="1" name=""/>
+        <p:cNvGrpSpPr/>
+        <p:nvPr/>
+      </p:nvGrpSpPr>
+      <p:grpSpPr>
+        <a:xfrm>
+          <a:off x="0" y="0"/>
+          <a:ext cx="0" cy="0"/>
+          <a:chOff x="0" y="0"/>
+          <a:chExt cx="0" cy="0"/>
+        </a:xfrm>
+      </p:grpSpPr>
+      <p:sp>
+        <p:nvSpPr>
+          <p:cNvPr id="2" name="Title 1">
+            <a:extLst>
+              <a:ext uri="{FF2B5EF4-FFF2-40B4-BE49-F238E27FC236}">
+                <a16:creationId xmlns:a16="http://schemas.microsoft.com/office/drawing/2014/main" id="{EAABADD6-21C5-4646-A19E-D151E1DBA45F}"/>
+              </a:ext>
+            </a:extLst>
+          </p:cNvPr>
+          <p:cNvSpPr>
+            <a:spLocks noGrp="1"/>
+          </p:cNvSpPr>
+          <p:nvPr>
+            <p:ph type="title"/>
+          </p:nvPr>
+        </p:nvSpPr>
+        <p:spPr/>
+        <p:txBody>
+          <a:bodyPr/>
+          <a:lstStyle/>
+          <a:p>
+            <a:r>
+              <a:rPr lang="en-US" dirty="0"/>
+              <a:t>And no dependence of QF on </a:t>
+            </a:r>
+            <a:r>
+              <a:rPr lang="en-US" dirty="0" err="1"/>
+              <a:t>nelements</a:t>
+            </a:r>
+            <a:r>
+              <a:rPr lang="en-US" dirty="0"/>
+              <a:t> and rate of RTN</a:t>
+            </a:r>
+          </a:p>
+        </p:txBody>
+      </p:sp>
+      <p:pic>
+        <p:nvPicPr>
+          <p:cNvPr id="4" name="Picture 3" descr="A picture containing sitting, side, table, parked&#10;&#10;Description automatically generated">
+            <a:extLst>
+              <a:ext uri="{FF2B5EF4-FFF2-40B4-BE49-F238E27FC236}">
+                <a16:creationId xmlns:a16="http://schemas.microsoft.com/office/drawing/2014/main" id="{706417FB-A387-214C-B1B6-457D6D46EAB3}"/>
+              </a:ext>
+            </a:extLst>
+          </p:cNvPr>
+          <p:cNvPicPr>
+            <a:picLocks noChangeAspect="1"/>
+          </p:cNvPicPr>
+          <p:nvPr/>
+        </p:nvPicPr>
+        <p:blipFill>
+          <a:blip r:embed="rId2"/>
+          <a:stretch>
+            <a:fillRect/>
+          </a:stretch>
+        </p:blipFill>
+        <p:spPr>
+          <a:xfrm>
+            <a:off x="393700" y="1690688"/>
+            <a:ext cx="11404600" cy="4660900"/>
+          </a:xfrm>
+          <a:prstGeom prst="rect">
+            <a:avLst/>
+          </a:prstGeom>
+        </p:spPr>
+      </p:pic>
+    </p:spTree>
+    <p:extLst>
+      <p:ext uri="{BB962C8B-B14F-4D97-AF65-F5344CB8AC3E}">
+        <p14:creationId xmlns:p14="http://schemas.microsoft.com/office/powerpoint/2010/main" val="134310948"/>
+      </p:ext>
+    </p:extLst>
+  </p:cSld>
+  <p:clrMapOvr>
+    <a:masterClrMapping/>
+  </p:clrMapOvr>
+</p:sld>
+</file>
+
 <file path=ppt/theme/theme1.xml><?xml version="1.0" encoding="utf-8"?>
 <a:theme xmlns:a="http://schemas.openxmlformats.org/drawingml/2006/main" name="Office Theme">
   <a:themeElements>

</xml_diff>